<commit_message>
metadata from July ctenidia RNA isolation
</commit_message>
<xml_diff>
--- a/Experimental-timeline.pptx
+++ b/Experimental-timeline.pptx
@@ -210,7 +210,7 @@
           <a:p>
             <a:fld id="{3389243F-B1BB-4202-BD78-416ACA555174}" type="datetimeFigureOut">
               <a:rPr lang="en-US" smtClean="0"/>
-              <a:t>6/10/19</a:t>
+              <a:t>6/19/19</a:t>
             </a:fld>
             <a:endParaRPr lang="en-US"/>
           </a:p>
@@ -3229,7 +3229,7 @@
           <a:p>
             <a:fld id="{997E942A-26CB-4FC8-A61F-ED7BAF06B75B}" type="datetimeFigureOut">
               <a:rPr lang="en-US" smtClean="0"/>
-              <a:t>6/10/19</a:t>
+              <a:t>6/19/19</a:t>
             </a:fld>
             <a:endParaRPr lang="en-US"/>
           </a:p>
@@ -3638,10 +3638,10 @@
         </p:nvGrpSpPr>
         <p:grpSpPr>
           <a:xfrm>
-            <a:off x="384220" y="1743254"/>
-            <a:ext cx="7947085" cy="3324333"/>
-            <a:chOff x="384220" y="1743254"/>
-            <a:chExt cx="7947085" cy="3324333"/>
+            <a:off x="384220" y="1593822"/>
+            <a:ext cx="7947085" cy="3473765"/>
+            <a:chOff x="384220" y="1593822"/>
+            <a:chExt cx="7947085" cy="3473765"/>
           </a:xfrm>
         </p:grpSpPr>
         <p:cxnSp>
@@ -3660,8 +3660,8 @@
           </p:nvCxnSpPr>
           <p:spPr>
             <a:xfrm flipV="1">
-              <a:off x="3384294" y="2515143"/>
-              <a:ext cx="18811" cy="898362"/>
+              <a:off x="3384294" y="2626905"/>
+              <a:ext cx="4095" cy="786601"/>
             </a:xfrm>
             <a:prstGeom prst="line">
               <a:avLst/>
@@ -3707,7 +3707,7 @@
           </p:nvCxnSpPr>
           <p:spPr>
             <a:xfrm flipV="1">
-              <a:off x="4517596" y="1794933"/>
+              <a:off x="4517596" y="1801070"/>
               <a:ext cx="0" cy="1612641"/>
             </a:xfrm>
             <a:prstGeom prst="line">
@@ -3753,8 +3753,8 @@
           </p:nvCxnSpPr>
           <p:spPr>
             <a:xfrm flipV="1">
-              <a:off x="1477712" y="2147194"/>
-              <a:ext cx="4124" cy="1317916"/>
+              <a:off x="1477712" y="2616822"/>
+              <a:ext cx="0" cy="848288"/>
             </a:xfrm>
             <a:prstGeom prst="line">
               <a:avLst/>
@@ -3793,8 +3793,8 @@
           </p:nvCxnSpPr>
           <p:spPr>
             <a:xfrm flipV="1">
-              <a:off x="668885" y="2147194"/>
-              <a:ext cx="0" cy="1313223"/>
+              <a:off x="671107" y="2016624"/>
+              <a:ext cx="0" cy="1796309"/>
             </a:xfrm>
             <a:prstGeom prst="line">
               <a:avLst/>
@@ -3844,9 +3844,7 @@
               <a:avLst/>
             </a:prstGeom>
             <a:solidFill>
-              <a:schemeClr val="bg1">
-                <a:lumMod val="95000"/>
-              </a:schemeClr>
+              <a:schemeClr val="bg1"/>
             </a:solidFill>
             <a:ln w="9525">
               <a:noFill/>
@@ -4615,7 +4613,7 @@
           </p:nvSpPr>
           <p:spPr>
             <a:xfrm>
-              <a:off x="624107" y="2106041"/>
+              <a:off x="632892" y="1975549"/>
               <a:ext cx="743617" cy="461665"/>
             </a:xfrm>
             <a:prstGeom prst="rect">
@@ -4658,7 +4656,7 @@
           </p:nvSpPr>
           <p:spPr>
             <a:xfrm>
-              <a:off x="1429311" y="2097730"/>
+              <a:off x="1437803" y="2567996"/>
               <a:ext cx="706802" cy="461665"/>
             </a:xfrm>
             <a:prstGeom prst="rect">
@@ -4701,7 +4699,7 @@
           </p:nvSpPr>
           <p:spPr>
             <a:xfrm>
-              <a:off x="2278552" y="2483370"/>
+              <a:off x="2279170" y="1977468"/>
               <a:ext cx="796639" cy="461665"/>
             </a:xfrm>
             <a:prstGeom prst="rect">
@@ -4766,12 +4764,15 @@
               <a:avLst/>
             </a:prstGeom>
             <a:solidFill>
-              <a:schemeClr val="bg1">
-                <a:lumMod val="85000"/>
-              </a:schemeClr>
+              <a:schemeClr val="bg1"/>
             </a:solidFill>
             <a:ln>
-              <a:noFill/>
+              <a:solidFill>
+                <a:schemeClr val="tx1">
+                  <a:lumMod val="65000"/>
+                  <a:lumOff val="35000"/>
+                </a:schemeClr>
+              </a:solidFill>
             </a:ln>
           </p:spPr>
           <p:txBody>
@@ -4785,8 +4786,8 @@
                 <a:rPr lang="en-US" sz="800" dirty="0">
                   <a:solidFill>
                     <a:schemeClr val="tx1">
-                      <a:lumMod val="75000"/>
-                      <a:lumOff val="25000"/>
+                      <a:lumMod val="85000"/>
+                      <a:lumOff val="15000"/>
                     </a:schemeClr>
                   </a:solidFill>
                   <a:latin typeface="Arial" panose="020B0604020202020204" pitchFamily="34" charset="0"/>
@@ -4813,8 +4814,8 @@
           </p:nvCxnSpPr>
           <p:spPr>
             <a:xfrm flipV="1">
-              <a:off x="2306931" y="2507224"/>
-              <a:ext cx="14494" cy="908096"/>
+              <a:off x="2306931" y="1995636"/>
+              <a:ext cx="17463" cy="1417877"/>
             </a:xfrm>
             <a:prstGeom prst="line">
               <a:avLst/>
@@ -4864,9 +4865,7 @@
               <a:avLst/>
             </a:prstGeom>
             <a:solidFill>
-              <a:schemeClr val="bg1">
-                <a:lumMod val="85000"/>
-              </a:schemeClr>
+              <a:schemeClr val="bg1"/>
             </a:solidFill>
             <a:ln>
               <a:solidFill>
@@ -4885,51 +4884,15 @@
                 <a:rPr lang="en-US" sz="800" dirty="0">
                   <a:solidFill>
                     <a:schemeClr val="tx1">
-                      <a:lumMod val="95000"/>
-                      <a:lumOff val="5000"/>
+                      <a:lumMod val="85000"/>
+                      <a:lumOff val="15000"/>
                     </a:schemeClr>
                   </a:solidFill>
                   <a:latin typeface="Arial" panose="020B0604020202020204" pitchFamily="34" charset="0"/>
                   <a:cs typeface="Arial" panose="020B0604020202020204" pitchFamily="34" charset="0"/>
                 </a:rPr>
-                <a:t>6</a:t>
+                <a:t>6ºC</a:t>
               </a:r>
-              <a:r>
-                <a:rPr lang="en-US" sz="800" dirty="0">
-                  <a:solidFill>
-                    <a:schemeClr val="tx1">
-                      <a:lumMod val="50000"/>
-                      <a:lumOff val="50000"/>
-                    </a:schemeClr>
-                  </a:solidFill>
-                  <a:latin typeface="Arial" panose="020B0604020202020204" pitchFamily="34" charset="0"/>
-                  <a:cs typeface="Arial" panose="020B0604020202020204" pitchFamily="34" charset="0"/>
-                </a:rPr>
-                <a:t>º</a:t>
-              </a:r>
-              <a:r>
-                <a:rPr lang="en-US" sz="800" dirty="0">
-                  <a:solidFill>
-                    <a:schemeClr val="tx1">
-                      <a:lumMod val="95000"/>
-                      <a:lumOff val="5000"/>
-                    </a:schemeClr>
-                  </a:solidFill>
-                  <a:latin typeface="Arial" panose="020B0604020202020204" pitchFamily="34" charset="0"/>
-                  <a:cs typeface="Arial" panose="020B0604020202020204" pitchFamily="34" charset="0"/>
-                </a:rPr>
-                <a:t>C</a:t>
-              </a:r>
-              <a:endParaRPr lang="en-US" sz="800" dirty="0">
-                <a:solidFill>
-                  <a:schemeClr val="tx1">
-                    <a:lumMod val="75000"/>
-                    <a:lumOff val="25000"/>
-                  </a:schemeClr>
-                </a:solidFill>
-                <a:latin typeface="Arial" panose="020B0604020202020204" pitchFamily="34" charset="0"/>
-                <a:cs typeface="Arial" panose="020B0604020202020204" pitchFamily="34" charset="0"/>
-              </a:endParaRPr>
             </a:p>
           </p:txBody>
         </p:sp>
@@ -4954,9 +4917,7 @@
               <a:avLst/>
             </a:prstGeom>
             <a:solidFill>
-              <a:schemeClr val="bg1">
-                <a:lumMod val="85000"/>
-              </a:schemeClr>
+              <a:schemeClr val="bg1"/>
             </a:solidFill>
             <a:ln>
               <a:solidFill>
@@ -4975,51 +4936,15 @@
                 <a:rPr lang="en-US" sz="800" dirty="0">
                   <a:solidFill>
                     <a:schemeClr val="tx1">
-                      <a:lumMod val="95000"/>
-                      <a:lumOff val="5000"/>
+                      <a:lumMod val="85000"/>
+                      <a:lumOff val="15000"/>
                     </a:schemeClr>
                   </a:solidFill>
                   <a:latin typeface="Arial" panose="020B0604020202020204" pitchFamily="34" charset="0"/>
                   <a:cs typeface="Arial" panose="020B0604020202020204" pitchFamily="34" charset="0"/>
                 </a:rPr>
-                <a:t>10</a:t>
+                <a:t>10ºC</a:t>
               </a:r>
-              <a:r>
-                <a:rPr lang="en-US" sz="800" dirty="0">
-                  <a:solidFill>
-                    <a:schemeClr val="tx1">
-                      <a:lumMod val="50000"/>
-                      <a:lumOff val="50000"/>
-                    </a:schemeClr>
-                  </a:solidFill>
-                  <a:latin typeface="Arial" panose="020B0604020202020204" pitchFamily="34" charset="0"/>
-                  <a:cs typeface="Arial" panose="020B0604020202020204" pitchFamily="34" charset="0"/>
-                </a:rPr>
-                <a:t>º</a:t>
-              </a:r>
-              <a:r>
-                <a:rPr lang="en-US" sz="800" dirty="0">
-                  <a:solidFill>
-                    <a:schemeClr val="tx1">
-                      <a:lumMod val="95000"/>
-                      <a:lumOff val="5000"/>
-                    </a:schemeClr>
-                  </a:solidFill>
-                  <a:latin typeface="Arial" panose="020B0604020202020204" pitchFamily="34" charset="0"/>
-                  <a:cs typeface="Arial" panose="020B0604020202020204" pitchFamily="34" charset="0"/>
-                </a:rPr>
-                <a:t>C</a:t>
-              </a:r>
-              <a:endParaRPr lang="en-US" sz="800" dirty="0">
-                <a:solidFill>
-                  <a:schemeClr val="tx1">
-                    <a:lumMod val="75000"/>
-                    <a:lumOff val="25000"/>
-                  </a:schemeClr>
-                </a:solidFill>
-                <a:latin typeface="Arial" panose="020B0604020202020204" pitchFamily="34" charset="0"/>
-                <a:cs typeface="Arial" panose="020B0604020202020204" pitchFamily="34" charset="0"/>
-              </a:endParaRPr>
             </a:p>
           </p:txBody>
         </p:sp>
@@ -5044,9 +4969,7 @@
               <a:avLst/>
             </a:prstGeom>
             <a:solidFill>
-              <a:schemeClr val="bg1">
-                <a:lumMod val="85000"/>
-              </a:schemeClr>
+              <a:schemeClr val="bg1"/>
             </a:solidFill>
             <a:ln>
               <a:solidFill>
@@ -5065,8 +4988,8 @@
                 <a:rPr lang="en-US" sz="800" dirty="0">
                   <a:solidFill>
                     <a:schemeClr val="tx1">
-                      <a:lumMod val="95000"/>
-                      <a:lumOff val="5000"/>
+                      <a:lumMod val="85000"/>
+                      <a:lumOff val="15000"/>
                     </a:schemeClr>
                   </a:solidFill>
                   <a:latin typeface="Arial" panose="020B0604020202020204" pitchFamily="34" charset="0"/>
@@ -5078,8 +5001,8 @@
                 <a:rPr lang="en-US" sz="800" dirty="0" err="1">
                   <a:solidFill>
                     <a:schemeClr val="tx1">
-                      <a:lumMod val="95000"/>
-                      <a:lumOff val="5000"/>
+                      <a:lumMod val="85000"/>
+                      <a:lumOff val="15000"/>
                     </a:schemeClr>
                   </a:solidFill>
                   <a:latin typeface="Arial" panose="020B0604020202020204" pitchFamily="34" charset="0"/>
@@ -5091,8 +5014,8 @@
                 <a:rPr lang="en-US" sz="800" dirty="0">
                   <a:solidFill>
                     <a:schemeClr val="tx1">
-                      <a:lumMod val="75000"/>
-                      <a:lumOff val="25000"/>
+                      <a:lumMod val="85000"/>
+                      <a:lumOff val="15000"/>
                     </a:schemeClr>
                   </a:solidFill>
                   <a:latin typeface="Arial" panose="020B0604020202020204" pitchFamily="34" charset="0"/>
@@ -5104,8 +5027,8 @@
                 <a:rPr lang="en-US" sz="800" baseline="-25000" dirty="0">
                   <a:solidFill>
                     <a:schemeClr val="tx1">
-                      <a:lumMod val="75000"/>
-                      <a:lumOff val="25000"/>
+                      <a:lumMod val="85000"/>
+                      <a:lumOff val="15000"/>
                     </a:schemeClr>
                   </a:solidFill>
                   <a:latin typeface="Arial" panose="020B0604020202020204" pitchFamily="34" charset="0"/>
@@ -5116,8 +5039,8 @@
               <a:endParaRPr lang="en-US" sz="800" dirty="0">
                 <a:solidFill>
                   <a:schemeClr val="tx1">
-                    <a:lumMod val="75000"/>
-                    <a:lumOff val="25000"/>
+                    <a:lumMod val="85000"/>
+                    <a:lumOff val="15000"/>
                   </a:schemeClr>
                 </a:solidFill>
                 <a:latin typeface="Arial" panose="020B0604020202020204" pitchFamily="34" charset="0"/>
@@ -5147,9 +5070,7 @@
               <a:avLst/>
             </a:prstGeom>
             <a:solidFill>
-              <a:schemeClr val="bg1">
-                <a:lumMod val="85000"/>
-              </a:schemeClr>
+              <a:schemeClr val="bg1"/>
             </a:solidFill>
             <a:ln>
               <a:solidFill>
@@ -5168,8 +5089,8 @@
                 <a:rPr lang="en-US" sz="800" dirty="0">
                   <a:solidFill>
                     <a:schemeClr val="tx1">
-                      <a:lumMod val="95000"/>
-                      <a:lumOff val="5000"/>
+                      <a:lumMod val="85000"/>
+                      <a:lumOff val="15000"/>
                     </a:schemeClr>
                   </a:solidFill>
                   <a:latin typeface="Arial" panose="020B0604020202020204" pitchFamily="34" charset="0"/>
@@ -5181,8 +5102,8 @@
                 <a:rPr lang="en-US" sz="800" dirty="0" err="1">
                   <a:solidFill>
                     <a:schemeClr val="tx1">
-                      <a:lumMod val="95000"/>
-                      <a:lumOff val="5000"/>
+                      <a:lumMod val="85000"/>
+                      <a:lumOff val="15000"/>
                     </a:schemeClr>
                   </a:solidFill>
                   <a:latin typeface="Arial" panose="020B0604020202020204" pitchFamily="34" charset="0"/>
@@ -5194,8 +5115,8 @@
                 <a:rPr lang="en-US" sz="800" dirty="0">
                   <a:solidFill>
                     <a:schemeClr val="tx1">
-                      <a:lumMod val="75000"/>
-                      <a:lumOff val="25000"/>
+                      <a:lumMod val="85000"/>
+                      <a:lumOff val="15000"/>
                     </a:schemeClr>
                   </a:solidFill>
                   <a:latin typeface="Arial" panose="020B0604020202020204" pitchFamily="34" charset="0"/>
@@ -5207,8 +5128,8 @@
                 <a:rPr lang="en-US" sz="800" baseline="-25000" dirty="0">
                   <a:solidFill>
                     <a:schemeClr val="tx1">
-                      <a:lumMod val="75000"/>
-                      <a:lumOff val="25000"/>
+                      <a:lumMod val="85000"/>
+                      <a:lumOff val="15000"/>
                     </a:schemeClr>
                   </a:solidFill>
                   <a:latin typeface="Arial" panose="020B0604020202020204" pitchFamily="34" charset="0"/>
@@ -5219,8 +5140,8 @@
               <a:endParaRPr lang="en-US" sz="800" dirty="0">
                 <a:solidFill>
                   <a:schemeClr val="tx1">
-                    <a:lumMod val="75000"/>
-                    <a:lumOff val="25000"/>
+                    <a:lumMod val="85000"/>
+                    <a:lumOff val="15000"/>
                   </a:schemeClr>
                 </a:solidFill>
                 <a:latin typeface="Arial" panose="020B0604020202020204" pitchFamily="34" charset="0"/>
@@ -5250,9 +5171,7 @@
               <a:avLst/>
             </a:prstGeom>
             <a:solidFill>
-              <a:schemeClr val="bg1">
-                <a:lumMod val="85000"/>
-              </a:schemeClr>
+              <a:schemeClr val="bg1"/>
             </a:solidFill>
             <a:ln>
               <a:solidFill>
@@ -5271,8 +5190,8 @@
                 <a:rPr lang="en-US" sz="800" dirty="0">
                   <a:solidFill>
                     <a:schemeClr val="tx1">
-                      <a:lumMod val="95000"/>
-                      <a:lumOff val="5000"/>
+                      <a:lumMod val="85000"/>
+                      <a:lumOff val="15000"/>
                     </a:schemeClr>
                   </a:solidFill>
                   <a:latin typeface="Arial" panose="020B0604020202020204" pitchFamily="34" charset="0"/>
@@ -5284,8 +5203,8 @@
                 <a:rPr lang="en-US" sz="800" dirty="0" err="1">
                   <a:solidFill>
                     <a:schemeClr val="tx1">
-                      <a:lumMod val="95000"/>
-                      <a:lumOff val="5000"/>
+                      <a:lumMod val="85000"/>
+                      <a:lumOff val="15000"/>
                     </a:schemeClr>
                   </a:solidFill>
                   <a:latin typeface="Arial" panose="020B0604020202020204" pitchFamily="34" charset="0"/>
@@ -5297,8 +5216,8 @@
                 <a:rPr lang="en-US" sz="800" dirty="0">
                   <a:solidFill>
                     <a:schemeClr val="tx1">
-                      <a:lumMod val="75000"/>
-                      <a:lumOff val="25000"/>
+                      <a:lumMod val="85000"/>
+                      <a:lumOff val="15000"/>
                     </a:schemeClr>
                   </a:solidFill>
                   <a:latin typeface="Arial" panose="020B0604020202020204" pitchFamily="34" charset="0"/>
@@ -5310,8 +5229,8 @@
                 <a:rPr lang="en-US" sz="800" baseline="-25000" dirty="0">
                   <a:solidFill>
                     <a:schemeClr val="tx1">
-                      <a:lumMod val="75000"/>
-                      <a:lumOff val="25000"/>
+                      <a:lumMod val="85000"/>
+                      <a:lumOff val="15000"/>
                     </a:schemeClr>
                   </a:solidFill>
                   <a:latin typeface="Arial" panose="020B0604020202020204" pitchFamily="34" charset="0"/>
@@ -5322,8 +5241,8 @@
               <a:endParaRPr lang="en-US" sz="800" dirty="0">
                 <a:solidFill>
                   <a:schemeClr val="tx1">
-                    <a:lumMod val="75000"/>
-                    <a:lumOff val="25000"/>
+                    <a:lumMod val="85000"/>
+                    <a:lumOff val="15000"/>
                   </a:schemeClr>
                 </a:solidFill>
                 <a:latin typeface="Arial" panose="020B0604020202020204" pitchFamily="34" charset="0"/>
@@ -5353,9 +5272,7 @@
               <a:avLst/>
             </a:prstGeom>
             <a:solidFill>
-              <a:schemeClr val="bg1">
-                <a:lumMod val="85000"/>
-              </a:schemeClr>
+              <a:schemeClr val="bg1"/>
             </a:solidFill>
             <a:ln>
               <a:solidFill>
@@ -5374,8 +5291,8 @@
                 <a:rPr lang="en-US" sz="800" dirty="0">
                   <a:solidFill>
                     <a:schemeClr val="tx1">
-                      <a:lumMod val="95000"/>
-                      <a:lumOff val="5000"/>
+                      <a:lumMod val="85000"/>
+                      <a:lumOff val="15000"/>
                     </a:schemeClr>
                   </a:solidFill>
                   <a:latin typeface="Arial" panose="020B0604020202020204" pitchFamily="34" charset="0"/>
@@ -5387,8 +5304,8 @@
                 <a:rPr lang="en-US" sz="800" dirty="0" err="1">
                   <a:solidFill>
                     <a:schemeClr val="tx1">
-                      <a:lumMod val="95000"/>
-                      <a:lumOff val="5000"/>
+                      <a:lumMod val="85000"/>
+                      <a:lumOff val="15000"/>
                     </a:schemeClr>
                   </a:solidFill>
                   <a:latin typeface="Arial" panose="020B0604020202020204" pitchFamily="34" charset="0"/>
@@ -5400,8 +5317,8 @@
                 <a:rPr lang="en-US" sz="800" dirty="0">
                   <a:solidFill>
                     <a:schemeClr val="tx1">
-                      <a:lumMod val="75000"/>
-                      <a:lumOff val="25000"/>
+                      <a:lumMod val="85000"/>
+                      <a:lumOff val="15000"/>
                     </a:schemeClr>
                   </a:solidFill>
                   <a:latin typeface="Arial" panose="020B0604020202020204" pitchFamily="34" charset="0"/>
@@ -5413,8 +5330,8 @@
                 <a:rPr lang="en-US" sz="800" baseline="-25000" dirty="0">
                   <a:solidFill>
                     <a:schemeClr val="tx1">
-                      <a:lumMod val="75000"/>
-                      <a:lumOff val="25000"/>
+                      <a:lumMod val="85000"/>
+                      <a:lumOff val="15000"/>
                     </a:schemeClr>
                   </a:solidFill>
                   <a:latin typeface="Arial" panose="020B0604020202020204" pitchFamily="34" charset="0"/>
@@ -5425,8 +5342,8 @@
               <a:endParaRPr lang="en-US" sz="800" dirty="0">
                 <a:solidFill>
                   <a:schemeClr val="tx1">
-                    <a:lumMod val="75000"/>
-                    <a:lumOff val="25000"/>
+                    <a:lumMod val="85000"/>
+                    <a:lumOff val="15000"/>
                   </a:schemeClr>
                 </a:solidFill>
                 <a:latin typeface="Arial" panose="020B0604020202020204" pitchFamily="34" charset="0"/>
@@ -5456,9 +5373,7 @@
               <a:avLst/>
             </a:prstGeom>
             <a:solidFill>
-              <a:schemeClr val="bg1">
-                <a:lumMod val="85000"/>
-              </a:schemeClr>
+              <a:schemeClr val="bg1"/>
             </a:solidFill>
             <a:ln>
               <a:solidFill>
@@ -5480,8 +5395,8 @@
                 <a:rPr lang="en-US" sz="800" dirty="0">
                   <a:solidFill>
                     <a:schemeClr val="tx1">
-                      <a:lumMod val="75000"/>
-                      <a:lumOff val="25000"/>
+                      <a:lumMod val="85000"/>
+                      <a:lumOff val="15000"/>
                     </a:schemeClr>
                   </a:solidFill>
                   <a:latin typeface="Arial" panose="020B0604020202020204" pitchFamily="34" charset="0"/>
@@ -5513,9 +5428,7 @@
               <a:avLst/>
             </a:prstGeom>
             <a:solidFill>
-              <a:schemeClr val="bg1">
-                <a:lumMod val="85000"/>
-              </a:schemeClr>
+              <a:schemeClr val="bg1"/>
             </a:solidFill>
             <a:ln>
               <a:solidFill>
@@ -5537,8 +5450,8 @@
                 <a:rPr lang="en-US" sz="800" dirty="0">
                   <a:solidFill>
                     <a:schemeClr val="tx1">
-                      <a:lumMod val="75000"/>
-                      <a:lumOff val="25000"/>
+                      <a:lumMod val="85000"/>
+                      <a:lumOff val="15000"/>
                     </a:schemeClr>
                   </a:solidFill>
                   <a:latin typeface="Arial" panose="020B0604020202020204" pitchFamily="34" charset="0"/>
@@ -5549,8 +5462,8 @@
               <a:endParaRPr lang="en-US" sz="800" baseline="-25000" dirty="0">
                 <a:solidFill>
                   <a:schemeClr val="tx1">
-                    <a:lumMod val="75000"/>
-                    <a:lumOff val="25000"/>
+                    <a:lumMod val="85000"/>
+                    <a:lumOff val="15000"/>
                   </a:schemeClr>
                 </a:solidFill>
                 <a:latin typeface="Arial" panose="020B0604020202020204" pitchFamily="34" charset="0"/>
@@ -5580,9 +5493,7 @@
               <a:avLst/>
             </a:prstGeom>
             <a:solidFill>
-              <a:schemeClr val="bg1">
-                <a:lumMod val="85000"/>
-              </a:schemeClr>
+              <a:schemeClr val="bg1"/>
             </a:solidFill>
             <a:ln>
               <a:solidFill>
@@ -5604,8 +5515,8 @@
                 <a:rPr lang="en-US" sz="800" dirty="0">
                   <a:solidFill>
                     <a:schemeClr val="tx1">
-                      <a:lumMod val="75000"/>
-                      <a:lumOff val="25000"/>
+                      <a:lumMod val="85000"/>
+                      <a:lumOff val="15000"/>
                     </a:schemeClr>
                   </a:solidFill>
                   <a:latin typeface="Arial" panose="020B0604020202020204" pitchFamily="34" charset="0"/>
@@ -5813,12 +5724,15 @@
               <a:avLst/>
             </a:prstGeom>
             <a:solidFill>
-              <a:schemeClr val="bg1">
-                <a:lumMod val="85000"/>
-              </a:schemeClr>
+              <a:schemeClr val="bg1"/>
             </a:solidFill>
             <a:ln w="9525">
-              <a:noFill/>
+              <a:solidFill>
+                <a:schemeClr val="tx1">
+                  <a:lumMod val="65000"/>
+                  <a:lumOff val="35000"/>
+                </a:schemeClr>
+              </a:solidFill>
             </a:ln>
           </p:spPr>
           <p:style>
@@ -5846,8 +5760,8 @@
                 <a:rPr lang="en-US" sz="800" dirty="0">
                   <a:solidFill>
                     <a:schemeClr val="tx1">
-                      <a:lumMod val="75000"/>
-                      <a:lumOff val="25000"/>
+                      <a:lumMod val="85000"/>
+                      <a:lumOff val="15000"/>
                     </a:schemeClr>
                   </a:solidFill>
                   <a:latin typeface="Arial" panose="020B0604020202020204" pitchFamily="34" charset="0"/>
@@ -5861,8 +5775,8 @@
               <a:endParaRPr lang="en-US" sz="800" dirty="0">
                 <a:solidFill>
                   <a:schemeClr val="tx1">
-                    <a:lumMod val="75000"/>
-                    <a:lumOff val="25000"/>
+                    <a:lumMod val="85000"/>
+                    <a:lumOff val="15000"/>
                   </a:schemeClr>
                 </a:solidFill>
                 <a:latin typeface="Arial" panose="020B0604020202020204" pitchFamily="34" charset="0"/>
@@ -5875,8 +5789,8 @@
                 <a:rPr lang="en-US" sz="800" dirty="0">
                   <a:solidFill>
                     <a:schemeClr val="tx1">
-                      <a:lumMod val="75000"/>
-                      <a:lumOff val="25000"/>
+                      <a:lumMod val="85000"/>
+                      <a:lumOff val="15000"/>
                     </a:schemeClr>
                   </a:solidFill>
                   <a:latin typeface="Arial" panose="020B0604020202020204" pitchFamily="34" charset="0"/>
@@ -5890,8 +5804,8 @@
               <a:endParaRPr lang="en-US" sz="800" dirty="0">
                 <a:solidFill>
                   <a:schemeClr val="tx1">
-                    <a:lumMod val="75000"/>
-                    <a:lumOff val="25000"/>
+                    <a:lumMod val="85000"/>
+                    <a:lumOff val="15000"/>
                   </a:schemeClr>
                 </a:solidFill>
                 <a:latin typeface="Arial" panose="020B0604020202020204" pitchFamily="34" charset="0"/>
@@ -5904,8 +5818,8 @@
                 <a:rPr lang="en-US" sz="800" dirty="0">
                   <a:solidFill>
                     <a:schemeClr val="tx1">
-                      <a:lumMod val="75000"/>
-                      <a:lumOff val="25000"/>
+                      <a:lumMod val="85000"/>
+                      <a:lumOff val="15000"/>
                     </a:schemeClr>
                   </a:solidFill>
                   <a:latin typeface="Arial" panose="020B0604020202020204" pitchFamily="34" charset="0"/>
@@ -5930,19 +5844,22 @@
           </p:nvSpPr>
           <p:spPr>
             <a:xfrm>
-              <a:off x="5968179" y="3545936"/>
+              <a:off x="5960745" y="3545936"/>
               <a:ext cx="959702" cy="529525"/>
             </a:xfrm>
             <a:prstGeom prst="rect">
               <a:avLst/>
             </a:prstGeom>
             <a:solidFill>
-              <a:schemeClr val="bg1">
-                <a:lumMod val="85000"/>
-              </a:schemeClr>
+              <a:schemeClr val="bg1"/>
             </a:solidFill>
             <a:ln w="9525">
-              <a:noFill/>
+              <a:solidFill>
+                <a:schemeClr val="tx1">
+                  <a:lumMod val="65000"/>
+                  <a:lumOff val="35000"/>
+                </a:schemeClr>
+              </a:solidFill>
             </a:ln>
           </p:spPr>
           <p:style>
@@ -5970,8 +5887,8 @@
                 <a:rPr lang="en-US" sz="800" dirty="0">
                   <a:solidFill>
                     <a:schemeClr val="tx1">
-                      <a:lumMod val="75000"/>
-                      <a:lumOff val="25000"/>
+                      <a:lumMod val="85000"/>
+                      <a:lumOff val="15000"/>
                     </a:schemeClr>
                   </a:solidFill>
                   <a:latin typeface="Arial" panose="020B0604020202020204" pitchFamily="34" charset="0"/>
@@ -5986,8 +5903,8 @@
                 <a:rPr lang="en-US" sz="800" dirty="0">
                   <a:solidFill>
                     <a:schemeClr val="tx1">
-                      <a:lumMod val="75000"/>
-                      <a:lumOff val="25000"/>
+                      <a:lumMod val="85000"/>
+                      <a:lumOff val="15000"/>
                     </a:schemeClr>
                   </a:solidFill>
                   <a:latin typeface="Arial" panose="020B0604020202020204" pitchFamily="34" charset="0"/>
@@ -6019,9 +5936,7 @@
               <a:avLst/>
             </a:prstGeom>
             <a:solidFill>
-              <a:schemeClr val="bg1">
-                <a:lumMod val="85000"/>
-              </a:schemeClr>
+              <a:schemeClr val="bg1"/>
             </a:solidFill>
             <a:ln>
               <a:solidFill>
@@ -6043,8 +5958,8 @@
                 <a:rPr lang="en-US" sz="800" dirty="0">
                   <a:solidFill>
                     <a:schemeClr val="tx1">
-                      <a:lumMod val="75000"/>
-                      <a:lumOff val="25000"/>
+                      <a:lumMod val="85000"/>
+                      <a:lumOff val="15000"/>
                     </a:schemeClr>
                   </a:solidFill>
                   <a:latin typeface="Arial" panose="020B0604020202020204" pitchFamily="34" charset="0"/>
@@ -6076,12 +5991,15 @@
               <a:avLst/>
             </a:prstGeom>
             <a:solidFill>
-              <a:schemeClr val="bg1">
-                <a:lumMod val="85000"/>
-              </a:schemeClr>
+              <a:schemeClr val="bg1"/>
             </a:solidFill>
             <a:ln>
-              <a:noFill/>
+              <a:solidFill>
+                <a:schemeClr val="tx1">
+                  <a:lumMod val="65000"/>
+                  <a:lumOff val="35000"/>
+                </a:schemeClr>
+              </a:solidFill>
             </a:ln>
           </p:spPr>
           <p:txBody>
@@ -6092,7 +6010,7 @@
             <a:p>
               <a:pPr algn="ctr"/>
               <a:r>
-                <a:rPr lang="en-US" sz="900" dirty="0">
+                <a:rPr lang="en-US" sz="900" b="1" dirty="0">
                   <a:solidFill>
                     <a:schemeClr val="tx1">
                       <a:lumMod val="85000"/>
@@ -6128,12 +6046,15 @@
               <a:avLst/>
             </a:prstGeom>
             <a:solidFill>
-              <a:schemeClr val="bg1">
-                <a:lumMod val="85000"/>
-              </a:schemeClr>
+              <a:schemeClr val="bg1"/>
             </a:solidFill>
             <a:ln>
-              <a:noFill/>
+              <a:solidFill>
+                <a:schemeClr val="tx1">
+                  <a:lumMod val="65000"/>
+                  <a:lumOff val="35000"/>
+                </a:schemeClr>
+              </a:solidFill>
             </a:ln>
           </p:spPr>
           <p:txBody>
@@ -6144,7 +6065,7 @@
             <a:p>
               <a:pPr algn="ctr"/>
               <a:r>
-                <a:rPr lang="en-US" sz="900" dirty="0">
+                <a:rPr lang="en-US" sz="900" b="1" dirty="0">
                   <a:solidFill>
                     <a:schemeClr val="tx1">
                       <a:lumMod val="85000"/>
@@ -6282,9 +6203,9 @@
             <p:nvPr/>
           </p:nvSpPr>
           <p:spPr>
-            <a:xfrm rot="16200000">
-              <a:off x="195242" y="2885353"/>
-              <a:ext cx="756637" cy="215444"/>
+            <a:xfrm>
+              <a:off x="509425" y="1815002"/>
+              <a:ext cx="756637" cy="223138"/>
             </a:xfrm>
             <a:prstGeom prst="rect">
               <a:avLst/>
@@ -6313,102 +6234,6 @@
                   <a:cs typeface="Arial" panose="020B0604020202020204" pitchFamily="34" charset="0"/>
                 </a:rPr>
                 <a:t>June 2013</a:t>
-              </a:r>
-            </a:p>
-          </p:txBody>
-        </p:sp>
-        <p:sp>
-          <p:nvSpPr>
-            <p:cNvPr id="350" name="Rectangle 349">
-              <a:extLst>
-                <a:ext uri="{FF2B5EF4-FFF2-40B4-BE49-F238E27FC236}">
-                  <a16:creationId xmlns:a16="http://schemas.microsoft.com/office/drawing/2014/main" id="{ABF45771-DFEB-5149-9D12-EC4B800667DE}"/>
-                </a:ext>
-              </a:extLst>
-            </p:cNvPr>
-            <p:cNvSpPr/>
-            <p:nvPr/>
-          </p:nvSpPr>
-          <p:spPr>
-            <a:xfrm rot="16200000">
-              <a:off x="1023265" y="2868725"/>
-              <a:ext cx="756635" cy="215444"/>
-            </a:xfrm>
-            <a:prstGeom prst="rect">
-              <a:avLst/>
-            </a:prstGeom>
-            <a:noFill/>
-            <a:ln>
-              <a:noFill/>
-            </a:ln>
-          </p:spPr>
-          <p:txBody>
-            <a:bodyPr wrap="square">
-              <a:spAutoFit/>
-            </a:bodyPr>
-            <a:lstStyle/>
-            <a:p>
-              <a:pPr algn="ctr"/>
-              <a:r>
-                <a:rPr lang="en-US" sz="800" b="1" dirty="0">
-                  <a:solidFill>
-                    <a:schemeClr val="tx1">
-                      <a:lumMod val="85000"/>
-                      <a:lumOff val="15000"/>
-                    </a:schemeClr>
-                  </a:solidFill>
-                  <a:latin typeface="Arial" panose="020B0604020202020204" pitchFamily="34" charset="0"/>
-                  <a:cs typeface="Arial" panose="020B0604020202020204" pitchFamily="34" charset="0"/>
-                </a:rPr>
-                <a:t>June 2015</a:t>
-              </a:r>
-            </a:p>
-          </p:txBody>
-        </p:sp>
-        <p:sp>
-          <p:nvSpPr>
-            <p:cNvPr id="351" name="Rectangle 350">
-              <a:extLst>
-                <a:ext uri="{FF2B5EF4-FFF2-40B4-BE49-F238E27FC236}">
-                  <a16:creationId xmlns:a16="http://schemas.microsoft.com/office/drawing/2014/main" id="{9F003532-8309-034C-9B46-50513F247E68}"/>
-                </a:ext>
-              </a:extLst>
-            </p:cNvPr>
-            <p:cNvSpPr/>
-            <p:nvPr/>
-          </p:nvSpPr>
-          <p:spPr>
-            <a:xfrm rot="16200000">
-              <a:off x="1793640" y="2835739"/>
-              <a:ext cx="872471" cy="215444"/>
-            </a:xfrm>
-            <a:prstGeom prst="rect">
-              <a:avLst/>
-            </a:prstGeom>
-            <a:noFill/>
-            <a:ln>
-              <a:noFill/>
-            </a:ln>
-          </p:spPr>
-          <p:txBody>
-            <a:bodyPr wrap="square">
-              <a:spAutoFit/>
-            </a:bodyPr>
-            <a:lstStyle/>
-            <a:p>
-              <a:pPr algn="ctr"/>
-              <a:r>
-                <a:rPr lang="en-US" sz="800" b="1" dirty="0">
-                  <a:solidFill>
-                    <a:schemeClr val="tx1">
-                      <a:lumMod val="85000"/>
-                      <a:lumOff val="15000"/>
-                    </a:schemeClr>
-                  </a:solidFill>
-                  <a:latin typeface="Arial" panose="020B0604020202020204" pitchFamily="34" charset="0"/>
-                  <a:cs typeface="Arial" panose="020B0604020202020204" pitchFamily="34" charset="0"/>
-                </a:rPr>
-                <a:t>Dec. 6, 2016</a:t>
               </a:r>
             </a:p>
           </p:txBody>
@@ -6551,7 +6376,7 @@
           </p:nvSpPr>
           <p:spPr>
             <a:xfrm>
-              <a:off x="2260412" y="3415320"/>
+              <a:off x="2266549" y="3415320"/>
               <a:ext cx="85157" cy="85149"/>
             </a:xfrm>
             <a:prstGeom prst="ellipse">
@@ -6601,102 +6426,6 @@
         </p:sp>
         <p:sp>
           <p:nvSpPr>
-            <p:cNvPr id="373" name="Rectangle 372">
-              <a:extLst>
-                <a:ext uri="{FF2B5EF4-FFF2-40B4-BE49-F238E27FC236}">
-                  <a16:creationId xmlns:a16="http://schemas.microsoft.com/office/drawing/2014/main" id="{E6F8D0A8-5705-694F-9134-822685FD564C}"/>
-                </a:ext>
-              </a:extLst>
-            </p:cNvPr>
-            <p:cNvSpPr/>
-            <p:nvPr/>
-          </p:nvSpPr>
-          <p:spPr>
-            <a:xfrm rot="16200000">
-              <a:off x="2881758" y="2798702"/>
-              <a:ext cx="861176" cy="215444"/>
-            </a:xfrm>
-            <a:prstGeom prst="rect">
-              <a:avLst/>
-            </a:prstGeom>
-            <a:noFill/>
-            <a:ln>
-              <a:noFill/>
-            </a:ln>
-          </p:spPr>
-          <p:txBody>
-            <a:bodyPr wrap="square">
-              <a:spAutoFit/>
-            </a:bodyPr>
-            <a:lstStyle/>
-            <a:p>
-              <a:pPr algn="ctr"/>
-              <a:r>
-                <a:rPr lang="en-US" sz="800" b="1" dirty="0">
-                  <a:solidFill>
-                    <a:schemeClr val="tx1">
-                      <a:lumMod val="85000"/>
-                      <a:lumOff val="15000"/>
-                    </a:schemeClr>
-                  </a:solidFill>
-                  <a:latin typeface="Arial" panose="020B0604020202020204" pitchFamily="34" charset="0"/>
-                  <a:cs typeface="Arial" panose="020B0604020202020204" pitchFamily="34" charset="0"/>
-                </a:rPr>
-                <a:t>Feb. 15, 2017</a:t>
-              </a:r>
-            </a:p>
-          </p:txBody>
-        </p:sp>
-        <p:sp>
-          <p:nvSpPr>
-            <p:cNvPr id="437" name="Rectangle 436">
-              <a:extLst>
-                <a:ext uri="{FF2B5EF4-FFF2-40B4-BE49-F238E27FC236}">
-                  <a16:creationId xmlns:a16="http://schemas.microsoft.com/office/drawing/2014/main" id="{C76A8B28-467A-4C4E-B595-55E5005695CE}"/>
-                </a:ext>
-              </a:extLst>
-            </p:cNvPr>
-            <p:cNvSpPr/>
-            <p:nvPr/>
-          </p:nvSpPr>
-          <p:spPr>
-            <a:xfrm rot="16200000">
-              <a:off x="3989541" y="2840333"/>
-              <a:ext cx="881660" cy="215444"/>
-            </a:xfrm>
-            <a:prstGeom prst="rect">
-              <a:avLst/>
-            </a:prstGeom>
-            <a:noFill/>
-            <a:ln>
-              <a:noFill/>
-            </a:ln>
-          </p:spPr>
-          <p:txBody>
-            <a:bodyPr wrap="square">
-              <a:spAutoFit/>
-            </a:bodyPr>
-            <a:lstStyle/>
-            <a:p>
-              <a:pPr algn="ctr"/>
-              <a:r>
-                <a:rPr lang="en-US" sz="800" b="1" dirty="0">
-                  <a:solidFill>
-                    <a:schemeClr val="tx1">
-                      <a:lumMod val="85000"/>
-                      <a:lumOff val="15000"/>
-                    </a:schemeClr>
-                  </a:solidFill>
-                  <a:latin typeface="Arial" panose="020B0604020202020204" pitchFamily="34" charset="0"/>
-                  <a:cs typeface="Arial" panose="020B0604020202020204" pitchFamily="34" charset="0"/>
-                </a:rPr>
-                <a:t>Apr. 11, 2017</a:t>
-              </a:r>
-            </a:p>
-          </p:txBody>
-        </p:sp>
-        <p:sp>
-          <p:nvSpPr>
             <p:cNvPr id="438" name="24 Elipse">
               <a:extLst>
                 <a:ext uri="{FF2B5EF4-FFF2-40B4-BE49-F238E27FC236}">
@@ -6709,7 +6438,7 @@
           </p:nvSpPr>
           <p:spPr>
             <a:xfrm>
-              <a:off x="4475017" y="3407574"/>
+              <a:off x="4475017" y="3413711"/>
               <a:ext cx="85157" cy="85149"/>
             </a:xfrm>
             <a:prstGeom prst="ellipse">
@@ -6771,7 +6500,7 @@
           </p:nvSpPr>
           <p:spPr>
             <a:xfrm>
-              <a:off x="4471708" y="1743254"/>
+              <a:off x="4484408" y="1754012"/>
               <a:ext cx="821091" cy="584775"/>
             </a:xfrm>
             <a:prstGeom prst="rect">
@@ -6831,8 +6560,8 @@
           </p:nvCxnSpPr>
           <p:spPr>
             <a:xfrm flipV="1">
-              <a:off x="4839245" y="2473824"/>
-              <a:ext cx="0" cy="942138"/>
+              <a:off x="4839245" y="2601253"/>
+              <a:ext cx="0" cy="814709"/>
             </a:xfrm>
             <a:prstGeom prst="line">
               <a:avLst/>
@@ -6875,7 +6604,7 @@
           </p:nvSpPr>
           <p:spPr>
             <a:xfrm>
-              <a:off x="4804617" y="3408011"/>
+              <a:off x="4798480" y="3414148"/>
               <a:ext cx="85157" cy="85149"/>
             </a:xfrm>
             <a:prstGeom prst="ellipse">
@@ -6937,7 +6666,7 @@
           </p:nvSpPr>
           <p:spPr>
             <a:xfrm>
-              <a:off x="4803896" y="2411370"/>
+              <a:off x="4803896" y="2605011"/>
               <a:ext cx="717436" cy="830997"/>
             </a:xfrm>
             <a:prstGeom prst="rect">
@@ -7008,54 +6737,6 @@
             </a:p>
           </p:txBody>
         </p:sp>
-        <p:sp>
-          <p:nvSpPr>
-            <p:cNvPr id="454" name="Rectangle 453">
-              <a:extLst>
-                <a:ext uri="{FF2B5EF4-FFF2-40B4-BE49-F238E27FC236}">
-                  <a16:creationId xmlns:a16="http://schemas.microsoft.com/office/drawing/2014/main" id="{7582A8B9-A4BD-9C47-8F32-ED7CCBD92C71}"/>
-                </a:ext>
-              </a:extLst>
-            </p:cNvPr>
-            <p:cNvSpPr/>
-            <p:nvPr/>
-          </p:nvSpPr>
-          <p:spPr>
-            <a:xfrm rot="16200000">
-              <a:off x="4309383" y="2837624"/>
-              <a:ext cx="881660" cy="215444"/>
-            </a:xfrm>
-            <a:prstGeom prst="rect">
-              <a:avLst/>
-            </a:prstGeom>
-            <a:noFill/>
-            <a:ln>
-              <a:noFill/>
-            </a:ln>
-          </p:spPr>
-          <p:txBody>
-            <a:bodyPr wrap="square">
-              <a:spAutoFit/>
-            </a:bodyPr>
-            <a:lstStyle/>
-            <a:p>
-              <a:pPr algn="ctr"/>
-              <a:r>
-                <a:rPr lang="en-US" sz="800" b="1" dirty="0">
-                  <a:solidFill>
-                    <a:schemeClr val="tx1">
-                      <a:lumMod val="85000"/>
-                      <a:lumOff val="15000"/>
-                    </a:schemeClr>
-                  </a:solidFill>
-                  <a:latin typeface="Arial" panose="020B0604020202020204" pitchFamily="34" charset="0"/>
-                  <a:cs typeface="Arial" panose="020B0604020202020204" pitchFamily="34" charset="0"/>
-                </a:rPr>
-                <a:t>May 11, 2017</a:t>
-              </a:r>
-            </a:p>
-          </p:txBody>
-        </p:sp>
         <p:cxnSp>
           <p:nvCxnSpPr>
             <p:cNvPr id="455" name="40 Conector recto">
@@ -7073,8 +6754,8 @@
           </p:nvCxnSpPr>
           <p:spPr>
             <a:xfrm flipV="1">
-              <a:off x="5900562" y="2200451"/>
-              <a:ext cx="0" cy="1203148"/>
+              <a:off x="5900562" y="2022761"/>
+              <a:ext cx="0" cy="1386975"/>
             </a:xfrm>
             <a:prstGeom prst="line">
               <a:avLst/>
@@ -7117,7 +6798,7 @@
           </p:nvSpPr>
           <p:spPr>
             <a:xfrm>
-              <a:off x="5857983" y="3403599"/>
+              <a:off x="5857983" y="3409736"/>
               <a:ext cx="85157" cy="85149"/>
             </a:xfrm>
             <a:prstGeom prst="ellipse">
@@ -7179,7 +6860,7 @@
           </p:nvSpPr>
           <p:spPr>
             <a:xfrm>
-              <a:off x="5854032" y="2155355"/>
+              <a:off x="5867157" y="1998135"/>
               <a:ext cx="818502" cy="584775"/>
             </a:xfrm>
             <a:prstGeom prst="rect">
@@ -7236,54 +6917,6 @@
         </p:sp>
         <p:sp>
           <p:nvSpPr>
-            <p:cNvPr id="458" name="Rectangle 457">
-              <a:extLst>
-                <a:ext uri="{FF2B5EF4-FFF2-40B4-BE49-F238E27FC236}">
-                  <a16:creationId xmlns:a16="http://schemas.microsoft.com/office/drawing/2014/main" id="{4F0AB9EF-20D7-214F-A62D-8D66DF1A4CC5}"/>
-                </a:ext>
-              </a:extLst>
-            </p:cNvPr>
-            <p:cNvSpPr/>
-            <p:nvPr/>
-          </p:nvSpPr>
-          <p:spPr>
-            <a:xfrm rot="16200000">
-              <a:off x="5376505" y="2883255"/>
-              <a:ext cx="881660" cy="215444"/>
-            </a:xfrm>
-            <a:prstGeom prst="rect">
-              <a:avLst/>
-            </a:prstGeom>
-            <a:noFill/>
-            <a:ln>
-              <a:noFill/>
-            </a:ln>
-          </p:spPr>
-          <p:txBody>
-            <a:bodyPr wrap="square">
-              <a:spAutoFit/>
-            </a:bodyPr>
-            <a:lstStyle/>
-            <a:p>
-              <a:pPr algn="ctr"/>
-              <a:r>
-                <a:rPr lang="en-US" sz="800" b="1" dirty="0">
-                  <a:solidFill>
-                    <a:schemeClr val="tx1">
-                      <a:lumMod val="85000"/>
-                      <a:lumOff val="15000"/>
-                    </a:schemeClr>
-                  </a:solidFill>
-                  <a:latin typeface="Arial" panose="020B0604020202020204" pitchFamily="34" charset="0"/>
-                  <a:cs typeface="Arial" panose="020B0604020202020204" pitchFamily="34" charset="0"/>
-                </a:rPr>
-                <a:t>Oct. 4, 2017</a:t>
-              </a:r>
-            </a:p>
-          </p:txBody>
-        </p:sp>
-        <p:sp>
-          <p:nvSpPr>
             <p:cNvPr id="481" name="Rectangle 480">
               <a:extLst>
                 <a:ext uri="{FF2B5EF4-FFF2-40B4-BE49-F238E27FC236}">
@@ -7296,7 +6929,7 @@
           </p:nvSpPr>
           <p:spPr>
             <a:xfrm>
-              <a:off x="3348054" y="2489653"/>
+              <a:off x="3345723" y="2571649"/>
               <a:ext cx="665492" cy="461665"/>
             </a:xfrm>
             <a:prstGeom prst="rect">
@@ -7367,8 +7000,8 @@
           </p:nvCxnSpPr>
           <p:spPr>
             <a:xfrm flipV="1">
-              <a:off x="6998082" y="2500756"/>
-              <a:ext cx="14494" cy="908096"/>
+              <a:off x="6998082" y="2625160"/>
+              <a:ext cx="0" cy="789830"/>
             </a:xfrm>
             <a:prstGeom prst="line">
               <a:avLst/>
@@ -7399,54 +7032,6 @@
         </p:cxnSp>
         <p:sp>
           <p:nvSpPr>
-            <p:cNvPr id="495" name="Rectangle 494">
-              <a:extLst>
-                <a:ext uri="{FF2B5EF4-FFF2-40B4-BE49-F238E27FC236}">
-                  <a16:creationId xmlns:a16="http://schemas.microsoft.com/office/drawing/2014/main" id="{5B2CEB1E-2C3A-F74B-9AEB-32ABFAA5674B}"/>
-                </a:ext>
-              </a:extLst>
-            </p:cNvPr>
-            <p:cNvSpPr/>
-            <p:nvPr/>
-          </p:nvSpPr>
-          <p:spPr>
-            <a:xfrm rot="16200000">
-              <a:off x="6493258" y="2829271"/>
-              <a:ext cx="872471" cy="215444"/>
-            </a:xfrm>
-            <a:prstGeom prst="rect">
-              <a:avLst/>
-            </a:prstGeom>
-            <a:noFill/>
-            <a:ln>
-              <a:noFill/>
-            </a:ln>
-          </p:spPr>
-          <p:txBody>
-            <a:bodyPr wrap="square">
-              <a:spAutoFit/>
-            </a:bodyPr>
-            <a:lstStyle/>
-            <a:p>
-              <a:pPr algn="ctr"/>
-              <a:r>
-                <a:rPr lang="en-US" sz="800" b="1" dirty="0">
-                  <a:solidFill>
-                    <a:schemeClr val="tx1">
-                      <a:lumMod val="85000"/>
-                      <a:lumOff val="15000"/>
-                    </a:schemeClr>
-                  </a:solidFill>
-                  <a:latin typeface="Arial" panose="020B0604020202020204" pitchFamily="34" charset="0"/>
-                  <a:cs typeface="Arial" panose="020B0604020202020204" pitchFamily="34" charset="0"/>
-                </a:rPr>
-                <a:t>June 12, 2018</a:t>
-              </a:r>
-            </a:p>
-          </p:txBody>
-        </p:sp>
-        <p:sp>
-          <p:nvSpPr>
             <p:cNvPr id="496" name="24 Elipse">
               <a:extLst>
                 <a:ext uri="{FF2B5EF4-FFF2-40B4-BE49-F238E27FC236}">
@@ -7459,7 +7044,7 @@
           </p:nvSpPr>
           <p:spPr>
             <a:xfrm>
-              <a:off x="6960030" y="3408852"/>
+              <a:off x="6953893" y="3414989"/>
               <a:ext cx="85157" cy="85149"/>
             </a:xfrm>
             <a:prstGeom prst="ellipse">
@@ -7521,7 +7106,7 @@
           </p:nvSpPr>
           <p:spPr>
             <a:xfrm>
-              <a:off x="6967979" y="2458556"/>
+              <a:off x="6966463" y="2607223"/>
               <a:ext cx="746710" cy="707886"/>
             </a:xfrm>
             <a:prstGeom prst="rect">
@@ -7587,6 +7172,742 @@
                   <a:cs typeface="Arial" panose="020B0604020202020204" pitchFamily="34" charset="0"/>
                 </a:rPr>
                 <a:t>86 days</a:t>
+              </a:r>
+            </a:p>
+          </p:txBody>
+        </p:sp>
+        <p:sp>
+          <p:nvSpPr>
+            <p:cNvPr id="72" name="Rectangle 71">
+              <a:extLst>
+                <a:ext uri="{FF2B5EF4-FFF2-40B4-BE49-F238E27FC236}">
+                  <a16:creationId xmlns:a16="http://schemas.microsoft.com/office/drawing/2014/main" id="{472CAC55-1A67-CD4D-AA7C-7D7C82ECC753}"/>
+                </a:ext>
+              </a:extLst>
+            </p:cNvPr>
+            <p:cNvSpPr/>
+            <p:nvPr/>
+          </p:nvSpPr>
+          <p:spPr>
+            <a:xfrm>
+              <a:off x="1316185" y="2406860"/>
+              <a:ext cx="756637" cy="223138"/>
+            </a:xfrm>
+            <a:prstGeom prst="rect">
+              <a:avLst/>
+            </a:prstGeom>
+            <a:noFill/>
+            <a:ln>
+              <a:noFill/>
+            </a:ln>
+          </p:spPr>
+          <p:txBody>
+            <a:bodyPr wrap="square">
+              <a:spAutoFit/>
+            </a:bodyPr>
+            <a:lstStyle/>
+            <a:p>
+              <a:pPr algn="ctr"/>
+              <a:r>
+                <a:rPr lang="en-US" sz="800" b="1" dirty="0">
+                  <a:solidFill>
+                    <a:schemeClr val="tx1">
+                      <a:lumMod val="85000"/>
+                      <a:lumOff val="15000"/>
+                    </a:schemeClr>
+                  </a:solidFill>
+                  <a:latin typeface="Arial" panose="020B0604020202020204" pitchFamily="34" charset="0"/>
+                  <a:cs typeface="Arial" panose="020B0604020202020204" pitchFamily="34" charset="0"/>
+                </a:rPr>
+                <a:t>June 2015</a:t>
+              </a:r>
+            </a:p>
+          </p:txBody>
+        </p:sp>
+        <p:sp>
+          <p:nvSpPr>
+            <p:cNvPr id="73" name="Rectangle 72">
+              <a:extLst>
+                <a:ext uri="{FF2B5EF4-FFF2-40B4-BE49-F238E27FC236}">
+                  <a16:creationId xmlns:a16="http://schemas.microsoft.com/office/drawing/2014/main" id="{BCEE8FDB-7B63-7F4C-A9EB-F87FE0DABFE3}"/>
+                </a:ext>
+              </a:extLst>
+            </p:cNvPr>
+            <p:cNvSpPr/>
+            <p:nvPr/>
+          </p:nvSpPr>
+          <p:spPr>
+            <a:xfrm>
+              <a:off x="2167794" y="1810961"/>
+              <a:ext cx="836136" cy="223138"/>
+            </a:xfrm>
+            <a:prstGeom prst="rect">
+              <a:avLst/>
+            </a:prstGeom>
+            <a:noFill/>
+            <a:ln>
+              <a:noFill/>
+            </a:ln>
+          </p:spPr>
+          <p:txBody>
+            <a:bodyPr wrap="square">
+              <a:spAutoFit/>
+            </a:bodyPr>
+            <a:lstStyle/>
+            <a:p>
+              <a:pPr algn="ctr"/>
+              <a:r>
+                <a:rPr lang="en-US" sz="800" b="1" dirty="0">
+                  <a:solidFill>
+                    <a:schemeClr val="tx1">
+                      <a:lumMod val="85000"/>
+                      <a:lumOff val="15000"/>
+                    </a:schemeClr>
+                  </a:solidFill>
+                  <a:latin typeface="Arial" panose="020B0604020202020204" pitchFamily="34" charset="0"/>
+                  <a:cs typeface="Arial" panose="020B0604020202020204" pitchFamily="34" charset="0"/>
+                </a:rPr>
+                <a:t>Dec. 6, 2016</a:t>
+              </a:r>
+            </a:p>
+          </p:txBody>
+        </p:sp>
+        <p:sp>
+          <p:nvSpPr>
+            <p:cNvPr id="74" name="Rectangle 73">
+              <a:extLst>
+                <a:ext uri="{FF2B5EF4-FFF2-40B4-BE49-F238E27FC236}">
+                  <a16:creationId xmlns:a16="http://schemas.microsoft.com/office/drawing/2014/main" id="{C58002C2-1BED-C64E-A1D5-7EC11587EC67}"/>
+                </a:ext>
+              </a:extLst>
+            </p:cNvPr>
+            <p:cNvSpPr/>
+            <p:nvPr/>
+          </p:nvSpPr>
+          <p:spPr>
+            <a:xfrm>
+              <a:off x="3235200" y="2431936"/>
+              <a:ext cx="903553" cy="223138"/>
+            </a:xfrm>
+            <a:prstGeom prst="rect">
+              <a:avLst/>
+            </a:prstGeom>
+            <a:noFill/>
+            <a:ln>
+              <a:noFill/>
+            </a:ln>
+          </p:spPr>
+          <p:txBody>
+            <a:bodyPr wrap="square">
+              <a:spAutoFit/>
+            </a:bodyPr>
+            <a:lstStyle/>
+            <a:p>
+              <a:pPr algn="ctr"/>
+              <a:r>
+                <a:rPr lang="en-US" sz="800" b="1" dirty="0">
+                  <a:solidFill>
+                    <a:schemeClr val="tx1">
+                      <a:lumMod val="85000"/>
+                      <a:lumOff val="15000"/>
+                    </a:schemeClr>
+                  </a:solidFill>
+                  <a:latin typeface="Arial" panose="020B0604020202020204" pitchFamily="34" charset="0"/>
+                  <a:cs typeface="Arial" panose="020B0604020202020204" pitchFamily="34" charset="0"/>
+                </a:rPr>
+                <a:t>Feb. 16, 2017</a:t>
+              </a:r>
+            </a:p>
+          </p:txBody>
+        </p:sp>
+        <p:sp>
+          <p:nvSpPr>
+            <p:cNvPr id="80" name="Rectangle 79">
+              <a:extLst>
+                <a:ext uri="{FF2B5EF4-FFF2-40B4-BE49-F238E27FC236}">
+                  <a16:creationId xmlns:a16="http://schemas.microsoft.com/office/drawing/2014/main" id="{CF272721-C828-1A48-AAE3-0452C4F4B105}"/>
+                </a:ext>
+              </a:extLst>
+            </p:cNvPr>
+            <p:cNvSpPr/>
+            <p:nvPr/>
+          </p:nvSpPr>
+          <p:spPr>
+            <a:xfrm>
+              <a:off x="4365952" y="1593822"/>
+              <a:ext cx="903553" cy="223138"/>
+            </a:xfrm>
+            <a:prstGeom prst="rect">
+              <a:avLst/>
+            </a:prstGeom>
+            <a:noFill/>
+            <a:ln>
+              <a:noFill/>
+            </a:ln>
+          </p:spPr>
+          <p:txBody>
+            <a:bodyPr wrap="square">
+              <a:spAutoFit/>
+            </a:bodyPr>
+            <a:lstStyle/>
+            <a:p>
+              <a:pPr algn="ctr"/>
+              <a:r>
+                <a:rPr lang="en-US" sz="800" b="1" dirty="0">
+                  <a:solidFill>
+                    <a:schemeClr val="tx1">
+                      <a:lumMod val="85000"/>
+                      <a:lumOff val="15000"/>
+                    </a:schemeClr>
+                  </a:solidFill>
+                  <a:latin typeface="Arial" panose="020B0604020202020204" pitchFamily="34" charset="0"/>
+                  <a:cs typeface="Arial" panose="020B0604020202020204" pitchFamily="34" charset="0"/>
+                </a:rPr>
+                <a:t>Apr. 11, 2017</a:t>
+              </a:r>
+            </a:p>
+          </p:txBody>
+        </p:sp>
+        <p:sp>
+          <p:nvSpPr>
+            <p:cNvPr id="81" name="Rectangle 80">
+              <a:extLst>
+                <a:ext uri="{FF2B5EF4-FFF2-40B4-BE49-F238E27FC236}">
+                  <a16:creationId xmlns:a16="http://schemas.microsoft.com/office/drawing/2014/main" id="{5CC531FA-E64F-204A-99E5-82801F9A236C}"/>
+                </a:ext>
+              </a:extLst>
+            </p:cNvPr>
+            <p:cNvSpPr/>
+            <p:nvPr/>
+          </p:nvSpPr>
+          <p:spPr>
+            <a:xfrm>
+              <a:off x="4677556" y="2402022"/>
+              <a:ext cx="903553" cy="223138"/>
+            </a:xfrm>
+            <a:prstGeom prst="rect">
+              <a:avLst/>
+            </a:prstGeom>
+            <a:noFill/>
+            <a:ln>
+              <a:noFill/>
+            </a:ln>
+          </p:spPr>
+          <p:txBody>
+            <a:bodyPr wrap="square">
+              <a:spAutoFit/>
+            </a:bodyPr>
+            <a:lstStyle/>
+            <a:p>
+              <a:pPr algn="ctr"/>
+              <a:r>
+                <a:rPr lang="en-US" sz="800" b="1" dirty="0">
+                  <a:solidFill>
+                    <a:schemeClr val="tx1">
+                      <a:lumMod val="85000"/>
+                      <a:lumOff val="15000"/>
+                    </a:schemeClr>
+                  </a:solidFill>
+                  <a:latin typeface="Arial" panose="020B0604020202020204" pitchFamily="34" charset="0"/>
+                  <a:cs typeface="Arial" panose="020B0604020202020204" pitchFamily="34" charset="0"/>
+                </a:rPr>
+                <a:t>May 11, 2017</a:t>
+              </a:r>
+            </a:p>
+          </p:txBody>
+        </p:sp>
+        <p:sp>
+          <p:nvSpPr>
+            <p:cNvPr id="83" name="Rectangle 82">
+              <a:extLst>
+                <a:ext uri="{FF2B5EF4-FFF2-40B4-BE49-F238E27FC236}">
+                  <a16:creationId xmlns:a16="http://schemas.microsoft.com/office/drawing/2014/main" id="{B93FBAD5-1BDC-3B4A-BE97-189DD4D72669}"/>
+                </a:ext>
+              </a:extLst>
+            </p:cNvPr>
+            <p:cNvSpPr/>
+            <p:nvPr/>
+          </p:nvSpPr>
+          <p:spPr>
+            <a:xfrm>
+              <a:off x="5698505" y="1813150"/>
+              <a:ext cx="903553" cy="223138"/>
+            </a:xfrm>
+            <a:prstGeom prst="rect">
+              <a:avLst/>
+            </a:prstGeom>
+            <a:noFill/>
+            <a:ln>
+              <a:noFill/>
+            </a:ln>
+          </p:spPr>
+          <p:txBody>
+            <a:bodyPr wrap="square">
+              <a:spAutoFit/>
+            </a:bodyPr>
+            <a:lstStyle/>
+            <a:p>
+              <a:pPr algn="ctr"/>
+              <a:r>
+                <a:rPr lang="en-US" sz="800" b="1" dirty="0">
+                  <a:solidFill>
+                    <a:schemeClr val="tx1">
+                      <a:lumMod val="85000"/>
+                      <a:lumOff val="15000"/>
+                    </a:schemeClr>
+                  </a:solidFill>
+                  <a:latin typeface="Arial" panose="020B0604020202020204" pitchFamily="34" charset="0"/>
+                  <a:cs typeface="Arial" panose="020B0604020202020204" pitchFamily="34" charset="0"/>
+                </a:rPr>
+                <a:t>Oct. 4, 2017</a:t>
+              </a:r>
+            </a:p>
+          </p:txBody>
+        </p:sp>
+        <p:sp>
+          <p:nvSpPr>
+            <p:cNvPr id="85" name="Rectangle 84">
+              <a:extLst>
+                <a:ext uri="{FF2B5EF4-FFF2-40B4-BE49-F238E27FC236}">
+                  <a16:creationId xmlns:a16="http://schemas.microsoft.com/office/drawing/2014/main" id="{601867D5-017B-D846-9268-DD695CA7F9B9}"/>
+                </a:ext>
+              </a:extLst>
+            </p:cNvPr>
+            <p:cNvSpPr/>
+            <p:nvPr/>
+          </p:nvSpPr>
+          <p:spPr>
+            <a:xfrm>
+              <a:off x="6857766" y="2433146"/>
+              <a:ext cx="903553" cy="223138"/>
+            </a:xfrm>
+            <a:prstGeom prst="rect">
+              <a:avLst/>
+            </a:prstGeom>
+            <a:noFill/>
+            <a:ln>
+              <a:noFill/>
+            </a:ln>
+          </p:spPr>
+          <p:txBody>
+            <a:bodyPr wrap="square">
+              <a:spAutoFit/>
+            </a:bodyPr>
+            <a:lstStyle/>
+            <a:p>
+              <a:pPr algn="ctr"/>
+              <a:r>
+                <a:rPr lang="en-US" sz="800" b="1" dirty="0">
+                  <a:solidFill>
+                    <a:schemeClr val="tx1">
+                      <a:lumMod val="85000"/>
+                      <a:lumOff val="15000"/>
+                    </a:schemeClr>
+                  </a:solidFill>
+                  <a:latin typeface="Arial" panose="020B0604020202020204" pitchFamily="34" charset="0"/>
+                  <a:cs typeface="Arial" panose="020B0604020202020204" pitchFamily="34" charset="0"/>
+                </a:rPr>
+                <a:t>June 12, 2018</a:t>
+              </a:r>
+            </a:p>
+          </p:txBody>
+        </p:sp>
+        <p:cxnSp>
+          <p:nvCxnSpPr>
+            <p:cNvPr id="87" name="40 Conector recto">
+              <a:extLst>
+                <a:ext uri="{FF2B5EF4-FFF2-40B4-BE49-F238E27FC236}">
+                  <a16:creationId xmlns:a16="http://schemas.microsoft.com/office/drawing/2014/main" id="{2538B251-7F09-1D4F-87E5-3AB6458E3B04}"/>
+                </a:ext>
+              </a:extLst>
+            </p:cNvPr>
+            <p:cNvCxnSpPr>
+              <a:cxnSpLocks/>
+            </p:cNvCxnSpPr>
+            <p:nvPr/>
+          </p:nvCxnSpPr>
+          <p:spPr>
+            <a:xfrm flipV="1">
+              <a:off x="3295537" y="3157220"/>
+              <a:ext cx="0" cy="262335"/>
+            </a:xfrm>
+            <a:prstGeom prst="line">
+              <a:avLst/>
+            </a:prstGeom>
+            <a:ln w="12700">
+              <a:solidFill>
+                <a:schemeClr val="tx1">
+                  <a:lumMod val="65000"/>
+                  <a:lumOff val="35000"/>
+                </a:schemeClr>
+              </a:solidFill>
+            </a:ln>
+          </p:spPr>
+          <p:style>
+            <a:lnRef idx="1">
+              <a:schemeClr val="accent1"/>
+            </a:lnRef>
+            <a:fillRef idx="0">
+              <a:schemeClr val="accent1"/>
+            </a:fillRef>
+            <a:effectRef idx="0">
+              <a:schemeClr val="accent1"/>
+            </a:effectRef>
+            <a:fontRef idx="minor">
+              <a:schemeClr val="tx1"/>
+            </a:fontRef>
+          </p:style>
+        </p:cxnSp>
+        <p:sp>
+          <p:nvSpPr>
+            <p:cNvPr id="88" name="24 Elipse">
+              <a:extLst>
+                <a:ext uri="{FF2B5EF4-FFF2-40B4-BE49-F238E27FC236}">
+                  <a16:creationId xmlns:a16="http://schemas.microsoft.com/office/drawing/2014/main" id="{72472EF2-4FB6-0247-9BE6-9A60B8AE6CBA}"/>
+                </a:ext>
+              </a:extLst>
+            </p:cNvPr>
+            <p:cNvSpPr/>
+            <p:nvPr/>
+          </p:nvSpPr>
+          <p:spPr>
+            <a:xfrm>
+              <a:off x="3252404" y="3416424"/>
+              <a:ext cx="85157" cy="85149"/>
+            </a:xfrm>
+            <a:prstGeom prst="ellipse">
+              <a:avLst/>
+            </a:prstGeom>
+            <a:solidFill>
+              <a:schemeClr val="tx1">
+                <a:lumMod val="85000"/>
+                <a:lumOff val="15000"/>
+              </a:schemeClr>
+            </a:solidFill>
+            <a:ln>
+              <a:noFill/>
+            </a:ln>
+          </p:spPr>
+          <p:style>
+            <a:lnRef idx="2">
+              <a:schemeClr val="accent1">
+                <a:shade val="50000"/>
+              </a:schemeClr>
+            </a:lnRef>
+            <a:fillRef idx="1">
+              <a:schemeClr val="accent1"/>
+            </a:fillRef>
+            <a:effectRef idx="0">
+              <a:schemeClr val="accent1"/>
+            </a:effectRef>
+            <a:fontRef idx="minor">
+              <a:schemeClr val="lt1"/>
+            </a:fontRef>
+          </p:style>
+          <p:txBody>
+            <a:bodyPr lIns="68572" tIns="34286" rIns="68572" bIns="34286" rtlCol="0" anchor="ctr"/>
+            <a:lstStyle/>
+            <a:p>
+              <a:pPr algn="ctr"/>
+              <a:endParaRPr lang="es-MX" sz="900">
+                <a:solidFill>
+                  <a:schemeClr val="tx1"/>
+                </a:solidFill>
+                <a:latin typeface="Arial" panose="020B0604020202020204" pitchFamily="34" charset="0"/>
+                <a:ea typeface="Segoe UI" panose="020B0502040204020203" pitchFamily="34" charset="0"/>
+                <a:cs typeface="Arial" panose="020B0604020202020204" pitchFamily="34" charset="0"/>
+              </a:endParaRPr>
+            </a:p>
+          </p:txBody>
+        </p:sp>
+        <p:sp>
+          <p:nvSpPr>
+            <p:cNvPr id="96" name="Rectangle 95">
+              <a:extLst>
+                <a:ext uri="{FF2B5EF4-FFF2-40B4-BE49-F238E27FC236}">
+                  <a16:creationId xmlns:a16="http://schemas.microsoft.com/office/drawing/2014/main" id="{CAAEB3C6-D00E-1B44-B643-9C51607A1D9E}"/>
+                </a:ext>
+              </a:extLst>
+            </p:cNvPr>
+            <p:cNvSpPr/>
+            <p:nvPr/>
+          </p:nvSpPr>
+          <p:spPr>
+            <a:xfrm>
+              <a:off x="2684368" y="3076344"/>
+              <a:ext cx="665492" cy="338554"/>
+            </a:xfrm>
+            <a:prstGeom prst="rect">
+              <a:avLst/>
+            </a:prstGeom>
+          </p:spPr>
+          <p:txBody>
+            <a:bodyPr wrap="square">
+              <a:spAutoFit/>
+            </a:bodyPr>
+            <a:lstStyle/>
+            <a:p>
+              <a:pPr algn="r"/>
+              <a:r>
+                <a:rPr lang="en-US" sz="800" dirty="0">
+                  <a:solidFill>
+                    <a:schemeClr val="tx1">
+                      <a:lumMod val="95000"/>
+                      <a:lumOff val="5000"/>
+                    </a:schemeClr>
+                  </a:solidFill>
+                  <a:latin typeface="Arial" panose="020B0604020202020204" pitchFamily="34" charset="0"/>
+                  <a:cs typeface="Arial" panose="020B0604020202020204" pitchFamily="34" charset="0"/>
+                </a:rPr>
+                <a:t>Gonad sampled</a:t>
+              </a:r>
+            </a:p>
+          </p:txBody>
+        </p:sp>
+        <p:sp>
+          <p:nvSpPr>
+            <p:cNvPr id="97" name="Rectangle 96">
+              <a:extLst>
+                <a:ext uri="{FF2B5EF4-FFF2-40B4-BE49-F238E27FC236}">
+                  <a16:creationId xmlns:a16="http://schemas.microsoft.com/office/drawing/2014/main" id="{8FB6B9B8-F530-B642-8B60-70C1974EA9BF}"/>
+                </a:ext>
+              </a:extLst>
+            </p:cNvPr>
+            <p:cNvSpPr/>
+            <p:nvPr/>
+          </p:nvSpPr>
+          <p:spPr>
+            <a:xfrm>
+              <a:off x="2649790" y="2941999"/>
+              <a:ext cx="774036" cy="223138"/>
+            </a:xfrm>
+            <a:prstGeom prst="rect">
+              <a:avLst/>
+            </a:prstGeom>
+            <a:noFill/>
+            <a:ln>
+              <a:noFill/>
+            </a:ln>
+          </p:spPr>
+          <p:txBody>
+            <a:bodyPr wrap="square">
+              <a:spAutoFit/>
+            </a:bodyPr>
+            <a:lstStyle/>
+            <a:p>
+              <a:pPr algn="ctr"/>
+              <a:r>
+                <a:rPr lang="en-US" sz="800" b="1" dirty="0">
+                  <a:solidFill>
+                    <a:schemeClr val="tx1">
+                      <a:lumMod val="85000"/>
+                      <a:lumOff val="15000"/>
+                    </a:schemeClr>
+                  </a:solidFill>
+                  <a:latin typeface="Arial" panose="020B0604020202020204" pitchFamily="34" charset="0"/>
+                  <a:cs typeface="Arial" panose="020B0604020202020204" pitchFamily="34" charset="0"/>
+                </a:rPr>
+                <a:t>Feb. 4, 2017</a:t>
+              </a:r>
+            </a:p>
+          </p:txBody>
+        </p:sp>
+        <p:cxnSp>
+          <p:nvCxnSpPr>
+            <p:cNvPr id="98" name="40 Conector recto">
+              <a:extLst>
+                <a:ext uri="{FF2B5EF4-FFF2-40B4-BE49-F238E27FC236}">
+                  <a16:creationId xmlns:a16="http://schemas.microsoft.com/office/drawing/2014/main" id="{6CDEB01F-989E-6B4A-9593-A035DED32C39}"/>
+                </a:ext>
+              </a:extLst>
+            </p:cNvPr>
+            <p:cNvCxnSpPr>
+              <a:cxnSpLocks/>
+            </p:cNvCxnSpPr>
+            <p:nvPr/>
+          </p:nvCxnSpPr>
+          <p:spPr>
+            <a:xfrm flipV="1">
+              <a:off x="4423961" y="3152083"/>
+              <a:ext cx="0" cy="255864"/>
+            </a:xfrm>
+            <a:prstGeom prst="line">
+              <a:avLst/>
+            </a:prstGeom>
+            <a:ln w="12700">
+              <a:solidFill>
+                <a:schemeClr val="tx1">
+                  <a:lumMod val="65000"/>
+                  <a:lumOff val="35000"/>
+                </a:schemeClr>
+              </a:solidFill>
+            </a:ln>
+          </p:spPr>
+          <p:style>
+            <a:lnRef idx="1">
+              <a:schemeClr val="accent1"/>
+            </a:lnRef>
+            <a:fillRef idx="0">
+              <a:schemeClr val="accent1"/>
+            </a:fillRef>
+            <a:effectRef idx="0">
+              <a:schemeClr val="accent1"/>
+            </a:effectRef>
+            <a:fontRef idx="minor">
+              <a:schemeClr val="tx1"/>
+            </a:fontRef>
+          </p:style>
+        </p:cxnSp>
+        <p:sp>
+          <p:nvSpPr>
+            <p:cNvPr id="99" name="24 Elipse">
+              <a:extLst>
+                <a:ext uri="{FF2B5EF4-FFF2-40B4-BE49-F238E27FC236}">
+                  <a16:creationId xmlns:a16="http://schemas.microsoft.com/office/drawing/2014/main" id="{0961D619-93FA-4B43-9009-8961858992A5}"/>
+                </a:ext>
+              </a:extLst>
+            </p:cNvPr>
+            <p:cNvSpPr/>
+            <p:nvPr/>
+          </p:nvSpPr>
+          <p:spPr>
+            <a:xfrm>
+              <a:off x="4380828" y="3409953"/>
+              <a:ext cx="85157" cy="85149"/>
+            </a:xfrm>
+            <a:prstGeom prst="ellipse">
+              <a:avLst/>
+            </a:prstGeom>
+            <a:solidFill>
+              <a:schemeClr val="tx1">
+                <a:lumMod val="85000"/>
+                <a:lumOff val="15000"/>
+              </a:schemeClr>
+            </a:solidFill>
+            <a:ln>
+              <a:noFill/>
+            </a:ln>
+          </p:spPr>
+          <p:style>
+            <a:lnRef idx="2">
+              <a:schemeClr val="accent1">
+                <a:shade val="50000"/>
+              </a:schemeClr>
+            </a:lnRef>
+            <a:fillRef idx="1">
+              <a:schemeClr val="accent1"/>
+            </a:fillRef>
+            <a:effectRef idx="0">
+              <a:schemeClr val="accent1"/>
+            </a:effectRef>
+            <a:fontRef idx="minor">
+              <a:schemeClr val="lt1"/>
+            </a:fontRef>
+          </p:style>
+          <p:txBody>
+            <a:bodyPr lIns="68572" tIns="34286" rIns="68572" bIns="34286" rtlCol="0" anchor="ctr"/>
+            <a:lstStyle/>
+            <a:p>
+              <a:pPr algn="ctr"/>
+              <a:endParaRPr lang="es-MX" sz="900">
+                <a:solidFill>
+                  <a:schemeClr val="tx1"/>
+                </a:solidFill>
+                <a:latin typeface="Arial" panose="020B0604020202020204" pitchFamily="34" charset="0"/>
+                <a:ea typeface="Segoe UI" panose="020B0502040204020203" pitchFamily="34" charset="0"/>
+                <a:cs typeface="Arial" panose="020B0604020202020204" pitchFamily="34" charset="0"/>
+              </a:endParaRPr>
+            </a:p>
+          </p:txBody>
+        </p:sp>
+        <p:sp>
+          <p:nvSpPr>
+            <p:cNvPr id="100" name="Rectangle 99">
+              <a:extLst>
+                <a:ext uri="{FF2B5EF4-FFF2-40B4-BE49-F238E27FC236}">
+                  <a16:creationId xmlns:a16="http://schemas.microsoft.com/office/drawing/2014/main" id="{29F2A691-DFFD-044A-AF90-4C90AF9E370E}"/>
+                </a:ext>
+              </a:extLst>
+            </p:cNvPr>
+            <p:cNvSpPr/>
+            <p:nvPr/>
+          </p:nvSpPr>
+          <p:spPr>
+            <a:xfrm>
+              <a:off x="3807396" y="3075529"/>
+              <a:ext cx="665492" cy="338554"/>
+            </a:xfrm>
+            <a:prstGeom prst="rect">
+              <a:avLst/>
+            </a:prstGeom>
+          </p:spPr>
+          <p:txBody>
+            <a:bodyPr wrap="square">
+              <a:spAutoFit/>
+            </a:bodyPr>
+            <a:lstStyle/>
+            <a:p>
+              <a:pPr algn="r"/>
+              <a:r>
+                <a:rPr lang="en-US" sz="800" dirty="0">
+                  <a:solidFill>
+                    <a:schemeClr val="tx1">
+                      <a:lumMod val="95000"/>
+                      <a:lumOff val="5000"/>
+                    </a:schemeClr>
+                  </a:solidFill>
+                  <a:latin typeface="Arial" panose="020B0604020202020204" pitchFamily="34" charset="0"/>
+                  <a:cs typeface="Arial" panose="020B0604020202020204" pitchFamily="34" charset="0"/>
+                </a:rPr>
+                <a:t>Gonad sampled</a:t>
+              </a:r>
+            </a:p>
+          </p:txBody>
+        </p:sp>
+        <p:sp>
+          <p:nvSpPr>
+            <p:cNvPr id="101" name="Rectangle 100">
+              <a:extLst>
+                <a:ext uri="{FF2B5EF4-FFF2-40B4-BE49-F238E27FC236}">
+                  <a16:creationId xmlns:a16="http://schemas.microsoft.com/office/drawing/2014/main" id="{0DCCC8D1-AEC3-FD4A-A2EC-C428304816EA}"/>
+                </a:ext>
+              </a:extLst>
+            </p:cNvPr>
+            <p:cNvSpPr/>
+            <p:nvPr/>
+          </p:nvSpPr>
+          <p:spPr>
+            <a:xfrm>
+              <a:off x="3784739" y="2946913"/>
+              <a:ext cx="774036" cy="215444"/>
+            </a:xfrm>
+            <a:prstGeom prst="rect">
+              <a:avLst/>
+            </a:prstGeom>
+            <a:noFill/>
+            <a:ln>
+              <a:noFill/>
+            </a:ln>
+          </p:spPr>
+          <p:txBody>
+            <a:bodyPr wrap="square">
+              <a:spAutoFit/>
+            </a:bodyPr>
+            <a:lstStyle/>
+            <a:p>
+              <a:pPr algn="ctr"/>
+              <a:r>
+                <a:rPr lang="en-US" sz="800" b="1" dirty="0">
+                  <a:solidFill>
+                    <a:schemeClr val="tx1">
+                      <a:lumMod val="85000"/>
+                      <a:lumOff val="15000"/>
+                    </a:schemeClr>
+                  </a:solidFill>
+                  <a:latin typeface="Arial" panose="020B0604020202020204" pitchFamily="34" charset="0"/>
+                  <a:cs typeface="Arial" panose="020B0604020202020204" pitchFamily="34" charset="0"/>
+                </a:rPr>
+                <a:t>Apr. 8, 2017</a:t>
               </a:r>
             </a:p>
           </p:txBody>

</xml_diff>